<commit_message>
update of slide deck
</commit_message>
<xml_diff>
--- a/presentation/slide_deck.pptx
+++ b/presentation/slide_deck.pptx
@@ -6618,6 +6618,69 @@
           </a:p>
         </p:txBody>
       </p:sp>
+      <p:grpSp>
+        <p:nvGrpSpPr>
+          <p:cNvPr id="7" name="Group 6"/>
+          <p:cNvGrpSpPr/>
+          <p:nvPr/>
+        </p:nvGrpSpPr>
+        <p:grpSpPr>
+          <a:xfrm>
+            <a:off x="3272250" y="822344"/>
+            <a:ext cx="2612015" cy="1524000"/>
+            <a:chOff x="3979285" y="822344"/>
+            <a:chExt cx="2612015" cy="1524000"/>
+          </a:xfrm>
+        </p:grpSpPr>
+        <p:pic>
+          <p:nvPicPr>
+            <p:cNvPr id="5" name="Picture 4"/>
+            <p:cNvPicPr>
+              <a:picLocks noChangeAspect="1"/>
+            </p:cNvPicPr>
+            <p:nvPr/>
+          </p:nvPicPr>
+          <p:blipFill>
+            <a:blip r:embed="rId2"/>
+            <a:stretch>
+              <a:fillRect/>
+            </a:stretch>
+          </p:blipFill>
+          <p:spPr>
+            <a:xfrm>
+              <a:off x="3979285" y="822344"/>
+              <a:ext cx="1190587" cy="1190587"/>
+            </a:xfrm>
+            <a:prstGeom prst="rect">
+              <a:avLst/>
+            </a:prstGeom>
+          </p:spPr>
+        </p:pic>
+        <p:pic>
+          <p:nvPicPr>
+            <p:cNvPr id="6" name="Picture 5"/>
+            <p:cNvPicPr>
+              <a:picLocks noChangeAspect="1"/>
+            </p:cNvPicPr>
+            <p:nvPr/>
+          </p:nvPicPr>
+          <p:blipFill>
+            <a:blip r:embed="rId3"/>
+            <a:stretch>
+              <a:fillRect/>
+            </a:stretch>
+          </p:blipFill>
+          <p:spPr>
+            <a:xfrm>
+              <a:off x="5245100" y="822344"/>
+              <a:ext cx="1346200" cy="1524000"/>
+            </a:xfrm>
+            <a:prstGeom prst="rect">
+              <a:avLst/>
+            </a:prstGeom>
+          </p:spPr>
+        </p:pic>
+      </p:grpSp>
     </p:spTree>
     <p:extLst>
       <p:ext uri="{BB962C8B-B14F-4D97-AF65-F5344CB8AC3E}">
@@ -8178,6 +8241,74 @@
           </a:p>
         </p:txBody>
       </p:sp>
+      <p:sp>
+        <p:nvSpPr>
+          <p:cNvPr id="14" name="Rounded Rectangle 13"/>
+          <p:cNvSpPr/>
+          <p:nvPr/>
+        </p:nvSpPr>
+        <p:spPr>
+          <a:xfrm>
+            <a:off x="457200" y="6468452"/>
+            <a:ext cx="291007" cy="209505"/>
+          </a:xfrm>
+          <a:prstGeom prst="roundRect">
+            <a:avLst/>
+          </a:prstGeom>
+        </p:spPr>
+        <p:style>
+          <a:lnRef idx="2">
+            <a:schemeClr val="accent2"/>
+          </a:lnRef>
+          <a:fillRef idx="1">
+            <a:schemeClr val="lt1"/>
+          </a:fillRef>
+          <a:effectRef idx="0">
+            <a:schemeClr val="accent2"/>
+          </a:effectRef>
+          <a:fontRef idx="minor">
+            <a:schemeClr val="dk1"/>
+          </a:fontRef>
+        </p:style>
+        <p:txBody>
+          <a:bodyPr rtlCol="0" anchor="ctr"/>
+          <a:lstStyle/>
+          <a:p>
+            <a:pPr algn="ctr"/>
+            <a:endParaRPr lang="en-US"/>
+          </a:p>
+        </p:txBody>
+      </p:sp>
+      <p:sp>
+        <p:nvSpPr>
+          <p:cNvPr id="15" name="TextBox 14"/>
+          <p:cNvSpPr txBox="1"/>
+          <p:nvPr/>
+        </p:nvSpPr>
+        <p:spPr>
+          <a:xfrm>
+            <a:off x="748207" y="6388539"/>
+            <a:ext cx="2185214" cy="369332"/>
+          </a:xfrm>
+          <a:prstGeom prst="rect">
+            <a:avLst/>
+          </a:prstGeom>
+          <a:noFill/>
+        </p:spPr>
+        <p:txBody>
+          <a:bodyPr wrap="none" rtlCol="0">
+            <a:spAutoFit/>
+          </a:bodyPr>
+          <a:lstStyle/>
+          <a:p>
+            <a:r>
+              <a:rPr lang="en-US" dirty="0" smtClean="0"/>
+              <a:t>Relevance to this talk</a:t>
+            </a:r>
+            <a:endParaRPr lang="en-US" dirty="0"/>
+          </a:p>
+        </p:txBody>
+      </p:sp>
     </p:spTree>
     <p:extLst>
       <p:ext uri="{BB962C8B-B14F-4D97-AF65-F5344CB8AC3E}">
@@ -8262,7 +8393,7 @@
           <a:graphicData uri="http://schemas.openxmlformats.org/presentationml/2006/ole">
             <mc:AlternateContent xmlns:mc="http://schemas.openxmlformats.org/markup-compatibility/2006">
               <mc:Choice xmlns:v="urn:schemas-microsoft-com:vml" Requires="v">
-                <p:oleObj spid="_x0000_s1038" name="Dokument" r:id="rId3" imgW="24330159" imgH="16558730" progId="Word.Document.12">
+                <p:oleObj spid="_x0000_s1041" name="Dokument" r:id="rId3" imgW="24330159" imgH="16558730" progId="Word.Document.12">
                   <p:link updateAutomatic="1"/>
                 </p:oleObj>
               </mc:Choice>

</xml_diff>

<commit_message>
updated slides improved coding
</commit_message>
<xml_diff>
--- a/presentation/slide_deck.pptx
+++ b/presentation/slide_deck.pptx
@@ -6984,7 +6984,7 @@
         </p:spPr>
         <p:txBody>
           <a:bodyPr>
-            <a:normAutofit fontScale="85000" lnSpcReduction="20000"/>
+            <a:normAutofit fontScale="77500" lnSpcReduction="20000"/>
           </a:bodyPr>
           <a:lstStyle/>
           <a:p>
@@ -7046,6 +7046,13 @@
             <a:r>
               <a:rPr lang="en-US" dirty="0" smtClean="0"/>
               <a:t>Handlers</a:t>
+            </a:r>
+          </a:p>
+          <a:p>
+            <a:pPr lvl="1"/>
+            <a:r>
+              <a:rPr lang="en-US" dirty="0" smtClean="0"/>
+              <a:t>Templates (jinja2)</a:t>
             </a:r>
           </a:p>
           <a:p>
@@ -7580,7 +7587,7 @@
       </p:sp>
       <p:pic>
         <p:nvPicPr>
-          <p:cNvPr id="6" name="Picture 5"/>
+          <p:cNvPr id="7" name="Picture 6"/>
           <p:cNvPicPr>
             <a:picLocks noChangeAspect="1"/>
           </p:cNvPicPr>
@@ -7594,8 +7601,8 @@
         </p:blipFill>
         <p:spPr>
           <a:xfrm>
-            <a:off x="1729008" y="1417638"/>
-            <a:ext cx="5676626" cy="5217636"/>
+            <a:off x="1674497" y="1382478"/>
+            <a:ext cx="5775563" cy="5308573"/>
           </a:xfrm>
           <a:prstGeom prst="rect">
             <a:avLst/>
@@ -8393,7 +8400,7 @@
           <a:graphicData uri="http://schemas.openxmlformats.org/presentationml/2006/ole">
             <mc:AlternateContent xmlns:mc="http://schemas.openxmlformats.org/markup-compatibility/2006">
               <mc:Choice xmlns:v="urn:schemas-microsoft-com:vml" Requires="v">
-                <p:oleObj spid="_x0000_s1041" name="Dokument" r:id="rId3" imgW="24330159" imgH="16558730" progId="Word.Document.12">
+                <p:oleObj spid="_x0000_s1043" name="Dokument" r:id="rId3" imgW="24330159" imgH="16558730" progId="Word.Document.12">
                   <p:link updateAutomatic="1"/>
                 </p:oleObj>
               </mc:Choice>

</xml_diff>

<commit_message>
improved slides improved ansible code
</commit_message>
<xml_diff>
--- a/presentation/slide_deck.pptx
+++ b/presentation/slide_deck.pptx
@@ -11,18 +11,19 @@
     <p:sldId id="259" r:id="rId5"/>
     <p:sldId id="258" r:id="rId6"/>
     <p:sldId id="261" r:id="rId7"/>
-    <p:sldId id="260" r:id="rId8"/>
-    <p:sldId id="270" r:id="rId9"/>
-    <p:sldId id="267" r:id="rId10"/>
-    <p:sldId id="271" r:id="rId11"/>
-    <p:sldId id="272" r:id="rId12"/>
-    <p:sldId id="273" r:id="rId13"/>
-    <p:sldId id="262" r:id="rId14"/>
-    <p:sldId id="266" r:id="rId15"/>
-    <p:sldId id="265" r:id="rId16"/>
-    <p:sldId id="264" r:id="rId17"/>
-    <p:sldId id="274" r:id="rId18"/>
-    <p:sldId id="263" r:id="rId19"/>
+    <p:sldId id="275" r:id="rId8"/>
+    <p:sldId id="260" r:id="rId9"/>
+    <p:sldId id="270" r:id="rId10"/>
+    <p:sldId id="267" r:id="rId11"/>
+    <p:sldId id="271" r:id="rId12"/>
+    <p:sldId id="272" r:id="rId13"/>
+    <p:sldId id="273" r:id="rId14"/>
+    <p:sldId id="262" r:id="rId15"/>
+    <p:sldId id="266" r:id="rId16"/>
+    <p:sldId id="265" r:id="rId17"/>
+    <p:sldId id="264" r:id="rId18"/>
+    <p:sldId id="274" r:id="rId19"/>
+    <p:sldId id="263" r:id="rId20"/>
   </p:sldIdLst>
   <p:sldSz cx="9144000" cy="6858000" type="screen4x3"/>
   <p:notesSz cx="6858000" cy="9144000"/>
@@ -6723,16 +6724,14 @@
         </p:nvSpPr>
         <p:spPr/>
         <p:txBody>
-          <a:bodyPr/>
+          <a:bodyPr>
+            <a:normAutofit fontScale="90000"/>
+          </a:bodyPr>
           <a:lstStyle/>
           <a:p>
             <a:r>
-              <a:rPr lang="en-US" dirty="0" err="1" smtClean="0"/>
-              <a:t>Opscode</a:t>
-            </a:r>
-            <a:r>
               <a:rPr lang="en-US" dirty="0" smtClean="0"/>
-              <a:t> Chef</a:t>
+              <a:t>Infrastructure Automation Approaches</a:t>
             </a:r>
             <a:endParaRPr lang="en-US" dirty="0"/>
           </a:p>
@@ -6760,7 +6759,7 @@
     </p:spTree>
     <p:extLst>
       <p:ext uri="{BB962C8B-B14F-4D97-AF65-F5344CB8AC3E}">
-        <p14:creationId xmlns:p14="http://schemas.microsoft.com/office/powerpoint/2010/main" val="218165202"/>
+        <p14:creationId xmlns:p14="http://schemas.microsoft.com/office/powerpoint/2010/main" val="2322301947"/>
       </p:ext>
     </p:extLst>
   </p:cSld>
@@ -6804,11 +6803,11 @@
           <a:p>
             <a:r>
               <a:rPr lang="en-US" dirty="0" err="1" smtClean="0"/>
-              <a:t>PuppetLabs</a:t>
+              <a:t>Opscode</a:t>
             </a:r>
             <a:r>
               <a:rPr lang="en-US" dirty="0" smtClean="0"/>
-              <a:t> Puppet</a:t>
+              <a:t> Chef</a:t>
             </a:r>
             <a:endParaRPr lang="en-US" dirty="0"/>
           </a:p>
@@ -6836,7 +6835,7 @@
     </p:spTree>
     <p:extLst>
       <p:ext uri="{BB962C8B-B14F-4D97-AF65-F5344CB8AC3E}">
-        <p14:creationId xmlns:p14="http://schemas.microsoft.com/office/powerpoint/2010/main" val="2536228780"/>
+        <p14:creationId xmlns:p14="http://schemas.microsoft.com/office/powerpoint/2010/main" val="218165202"/>
       </p:ext>
     </p:extLst>
   </p:cSld>
@@ -6865,7 +6864,7 @@
       </p:grpSpPr>
       <p:sp>
         <p:nvSpPr>
-          <p:cNvPr id="4" name="Title 3"/>
+          <p:cNvPr id="2" name="Title 1"/>
           <p:cNvSpPr>
             <a:spLocks noGrp="1"/>
           </p:cNvSpPr>
@@ -6880,7 +6879,11 @@
           <a:p>
             <a:r>
               <a:rPr lang="en-US" dirty="0" err="1" smtClean="0"/>
-              <a:t>Ansible</a:t>
+              <a:t>PuppetLabs</a:t>
+            </a:r>
+            <a:r>
+              <a:rPr lang="en-US" dirty="0" smtClean="0"/>
+              <a:t> Puppet</a:t>
             </a:r>
             <a:endParaRPr lang="en-US" dirty="0"/>
           </a:p>
@@ -6888,12 +6891,12 @@
       </p:sp>
       <p:sp>
         <p:nvSpPr>
-          <p:cNvPr id="5" name="Text Placeholder 4"/>
+          <p:cNvPr id="3" name="Content Placeholder 2"/>
           <p:cNvSpPr>
             <a:spLocks noGrp="1"/>
           </p:cNvSpPr>
           <p:nvPr>
-            <p:ph type="body" idx="1"/>
+            <p:ph idx="1"/>
           </p:nvPr>
         </p:nvSpPr>
         <p:spPr/>
@@ -6908,7 +6911,7 @@
     </p:spTree>
     <p:extLst>
       <p:ext uri="{BB962C8B-B14F-4D97-AF65-F5344CB8AC3E}">
-        <p14:creationId xmlns:p14="http://schemas.microsoft.com/office/powerpoint/2010/main" val="464908616"/>
+        <p14:creationId xmlns:p14="http://schemas.microsoft.com/office/powerpoint/2010/main" val="2536228780"/>
       </p:ext>
     </p:extLst>
   </p:cSld>
@@ -6937,7 +6940,7 @@
       </p:grpSpPr>
       <p:sp>
         <p:nvSpPr>
-          <p:cNvPr id="2" name="Title 1"/>
+          <p:cNvPr id="4" name="Title 3"/>
           <p:cNvSpPr>
             <a:spLocks noGrp="1"/>
           </p:cNvSpPr>
@@ -6951,224 +6954,36 @@
           <a:lstStyle/>
           <a:p>
             <a:r>
-              <a:rPr lang="en-US" dirty="0" smtClean="0"/>
-              <a:t>What is </a:t>
-            </a:r>
-            <a:r>
               <a:rPr lang="en-US" dirty="0" err="1" smtClean="0"/>
               <a:t>Ansible</a:t>
             </a:r>
-            <a:r>
-              <a:rPr lang="en-US" dirty="0" smtClean="0"/>
-              <a:t>?</a:t>
-            </a:r>
             <a:endParaRPr lang="en-US" dirty="0"/>
           </a:p>
         </p:txBody>
       </p:sp>
       <p:sp>
         <p:nvSpPr>
-          <p:cNvPr id="3" name="Content Placeholder 2"/>
+          <p:cNvPr id="5" name="Text Placeholder 4"/>
           <p:cNvSpPr>
             <a:spLocks noGrp="1"/>
           </p:cNvSpPr>
           <p:nvPr>
-            <p:ph idx="1"/>
+            <p:ph type="body" idx="1"/>
           </p:nvPr>
         </p:nvSpPr>
-        <p:spPr>
-          <a:xfrm>
-            <a:off x="457200" y="1600200"/>
-            <a:ext cx="8229600" cy="4776053"/>
-          </a:xfrm>
-        </p:spPr>
-        <p:txBody>
-          <a:bodyPr>
-            <a:normAutofit fontScale="77500" lnSpcReduction="20000"/>
-          </a:bodyPr>
+        <p:spPr/>
+        <p:txBody>
+          <a:bodyPr/>
           <a:lstStyle/>
           <a:p>
-            <a:r>
-              <a:rPr lang="en-US" dirty="0" smtClean="0"/>
-              <a:t>A YAML-based, descriptive language </a:t>
-            </a:r>
-            <a:br>
-              <a:rPr lang="en-US" dirty="0" smtClean="0"/>
-            </a:br>
-            <a:r>
-              <a:rPr lang="en-US" dirty="0" smtClean="0"/>
-              <a:t>for automation of infrastructure setups</a:t>
-            </a:r>
-          </a:p>
-          <a:p>
-            <a:endParaRPr lang="en-US" dirty="0" smtClean="0"/>
-          </a:p>
-          <a:p>
-            <a:endParaRPr lang="en-US" dirty="0"/>
-          </a:p>
-          <a:p>
-            <a:r>
-              <a:rPr lang="en-US" dirty="0" smtClean="0"/>
-              <a:t>Owns concepts to structure definition files:</a:t>
-            </a:r>
-          </a:p>
-          <a:p>
-            <a:pPr lvl="1"/>
-            <a:r>
-              <a:rPr lang="en-US" dirty="0" smtClean="0"/>
-              <a:t>Variables (</a:t>
-            </a:r>
-            <a:r>
-              <a:rPr lang="en-US" dirty="0" err="1" smtClean="0"/>
-              <a:t>vars</a:t>
-            </a:r>
-            <a:r>
-              <a:rPr lang="en-US" dirty="0" smtClean="0"/>
-              <a:t>)</a:t>
-            </a:r>
-          </a:p>
-          <a:p>
-            <a:pPr lvl="1"/>
-            <a:r>
-              <a:rPr lang="en-US" dirty="0" smtClean="0"/>
-              <a:t>Tasks</a:t>
-            </a:r>
-          </a:p>
-          <a:p>
-            <a:pPr lvl="1"/>
-            <a:r>
-              <a:rPr lang="en-US" dirty="0" smtClean="0"/>
-              <a:t>Profiles</a:t>
-            </a:r>
-          </a:p>
-          <a:p>
-            <a:pPr lvl="1"/>
-            <a:r>
-              <a:rPr lang="en-US" dirty="0" smtClean="0"/>
-              <a:t>Handlers</a:t>
-            </a:r>
-          </a:p>
-          <a:p>
-            <a:pPr lvl="1"/>
-            <a:r>
-              <a:rPr lang="en-US" dirty="0" smtClean="0"/>
-              <a:t>Templates (jinja2)</a:t>
-            </a:r>
-          </a:p>
-          <a:p>
-            <a:r>
-              <a:rPr lang="en-US" dirty="0" smtClean="0"/>
-              <a:t>Provides reusable modules to run tasks</a:t>
-            </a:r>
-            <a:endParaRPr lang="en-US" dirty="0" smtClean="0"/>
-          </a:p>
-          <a:p>
-            <a:endParaRPr lang="en-US" dirty="0" smtClean="0"/>
-          </a:p>
-          <a:p>
-            <a:r>
-              <a:rPr lang="en-US" dirty="0" smtClean="0"/>
-              <a:t>Can manage known hosts &amp; cloud services</a:t>
-            </a:r>
-            <a:endParaRPr lang="en-US" dirty="0"/>
-          </a:p>
-        </p:txBody>
-      </p:sp>
-      <p:pic>
-        <p:nvPicPr>
-          <p:cNvPr id="5" name="Picture 4"/>
-          <p:cNvPicPr>
-            <a:picLocks noChangeAspect="1"/>
-          </p:cNvPicPr>
-          <p:nvPr/>
-        </p:nvPicPr>
-        <p:blipFill>
-          <a:blip r:embed="rId2"/>
-          <a:stretch>
-            <a:fillRect/>
-          </a:stretch>
-        </p:blipFill>
-        <p:spPr>
-          <a:xfrm>
-            <a:off x="457200" y="227051"/>
-            <a:ext cx="1190587" cy="1190587"/>
-          </a:xfrm>
-          <a:prstGeom prst="rect">
-            <a:avLst/>
-          </a:prstGeom>
-        </p:spPr>
-      </p:pic>
-      <p:sp>
-        <p:nvSpPr>
-          <p:cNvPr id="6" name="TextBox 5"/>
-          <p:cNvSpPr txBox="1"/>
-          <p:nvPr/>
-        </p:nvSpPr>
-        <p:spPr>
-          <a:xfrm>
-            <a:off x="7197013" y="1606329"/>
-            <a:ext cx="1799253" cy="1569660"/>
-          </a:xfrm>
-          <a:prstGeom prst="rect">
-            <a:avLst/>
-          </a:prstGeom>
-          <a:noFill/>
-          <a:ln>
-            <a:solidFill>
-              <a:schemeClr val="tx1"/>
-            </a:solidFill>
-          </a:ln>
-        </p:spPr>
-        <p:txBody>
-          <a:bodyPr wrap="square" rtlCol="0">
-            <a:spAutoFit/>
-          </a:bodyPr>
-          <a:lstStyle/>
-          <a:p>
-            <a:r>
-              <a:rPr lang="en-US" sz="1600" b="1" dirty="0" smtClean="0"/>
-              <a:t>YAML: true</a:t>
-            </a:r>
-            <a:br>
-              <a:rPr lang="en-US" sz="1600" b="1" dirty="0" smtClean="0"/>
-            </a:br>
-            <a:r>
-              <a:rPr lang="en-US" sz="1600" b="1" dirty="0" smtClean="0"/>
-              <a:t>Fruits:</a:t>
-            </a:r>
-          </a:p>
-          <a:p>
-            <a:r>
-              <a:rPr lang="en-US" sz="1600" b="1" dirty="0" smtClean="0"/>
-              <a:t>- name: Apple</a:t>
-            </a:r>
-          </a:p>
-          <a:p>
-            <a:r>
-              <a:rPr lang="en-US" sz="1600" b="1" dirty="0" smtClean="0"/>
-              <a:t>   price: .50</a:t>
-            </a:r>
-          </a:p>
-          <a:p>
-            <a:r>
-              <a:rPr lang="en-US" sz="1600" b="1" dirty="0" smtClean="0"/>
-              <a:t>- name: Banana</a:t>
-            </a:r>
-            <a:br>
-              <a:rPr lang="en-US" sz="1600" b="1" dirty="0" smtClean="0"/>
-            </a:br>
-            <a:r>
-              <a:rPr lang="en-US" sz="1600" b="1" dirty="0" smtClean="0"/>
-              <a:t>   price: .80</a:t>
-            </a:r>
-            <a:endParaRPr lang="en-US" sz="1600" b="1" dirty="0"/>
+            <a:endParaRPr lang="en-US"/>
           </a:p>
         </p:txBody>
       </p:sp>
     </p:spTree>
     <p:extLst>
       <p:ext uri="{BB962C8B-B14F-4D97-AF65-F5344CB8AC3E}">
-        <p14:creationId xmlns:p14="http://schemas.microsoft.com/office/powerpoint/2010/main" val="3771616672"/>
+        <p14:creationId xmlns:p14="http://schemas.microsoft.com/office/powerpoint/2010/main" val="464908616"/>
       </p:ext>
     </p:extLst>
   </p:cSld>
@@ -7211,12 +7026,16 @@
           <a:lstStyle/>
           <a:p>
             <a:r>
+              <a:rPr lang="en-US" dirty="0" smtClean="0"/>
+              <a:t>What is </a:t>
+            </a:r>
+            <a:r>
               <a:rPr lang="en-US" dirty="0" err="1" smtClean="0"/>
               <a:t>Ansible</a:t>
             </a:r>
             <a:r>
               <a:rPr lang="en-US" dirty="0" smtClean="0"/>
-              <a:t> Setup</a:t>
+              <a:t>?</a:t>
             </a:r>
             <a:endParaRPr lang="en-US" dirty="0"/>
           </a:p>
@@ -7232,19 +7051,199 @@
             <p:ph idx="1"/>
           </p:nvPr>
         </p:nvSpPr>
-        <p:spPr/>
-        <p:txBody>
-          <a:bodyPr/>
+        <p:spPr>
+          <a:xfrm>
+            <a:off x="457200" y="1600200"/>
+            <a:ext cx="8229600" cy="4776053"/>
+          </a:xfrm>
+        </p:spPr>
+        <p:txBody>
+          <a:bodyPr>
+            <a:normAutofit fontScale="77500" lnSpcReduction="20000"/>
+          </a:bodyPr>
           <a:lstStyle/>
           <a:p>
-            <a:endParaRPr lang="en-US"/>
+            <a:r>
+              <a:rPr lang="en-US" dirty="0" smtClean="0"/>
+              <a:t>A YAML-based, descriptive language </a:t>
+            </a:r>
+            <a:br>
+              <a:rPr lang="en-US" dirty="0" smtClean="0"/>
+            </a:br>
+            <a:r>
+              <a:rPr lang="en-US" dirty="0" smtClean="0"/>
+              <a:t>for automation of infrastructure setups</a:t>
+            </a:r>
+          </a:p>
+          <a:p>
+            <a:endParaRPr lang="en-US" dirty="0" smtClean="0"/>
+          </a:p>
+          <a:p>
+            <a:endParaRPr lang="en-US" dirty="0"/>
+          </a:p>
+          <a:p>
+            <a:r>
+              <a:rPr lang="en-US" dirty="0" smtClean="0"/>
+              <a:t>Owns concepts to structure definition files:</a:t>
+            </a:r>
+          </a:p>
+          <a:p>
+            <a:pPr lvl="1"/>
+            <a:r>
+              <a:rPr lang="en-US" dirty="0" smtClean="0"/>
+              <a:t>Variables (</a:t>
+            </a:r>
+            <a:r>
+              <a:rPr lang="en-US" dirty="0" err="1" smtClean="0"/>
+              <a:t>vars</a:t>
+            </a:r>
+            <a:r>
+              <a:rPr lang="en-US" dirty="0" smtClean="0"/>
+              <a:t>)</a:t>
+            </a:r>
+          </a:p>
+          <a:p>
+            <a:pPr lvl="1"/>
+            <a:r>
+              <a:rPr lang="en-US" dirty="0" smtClean="0"/>
+              <a:t>Tasks</a:t>
+            </a:r>
+          </a:p>
+          <a:p>
+            <a:pPr lvl="1"/>
+            <a:r>
+              <a:rPr lang="en-US" dirty="0" smtClean="0"/>
+              <a:t>Profiles</a:t>
+            </a:r>
+          </a:p>
+          <a:p>
+            <a:pPr lvl="1"/>
+            <a:r>
+              <a:rPr lang="en-US" dirty="0" smtClean="0"/>
+              <a:t>Handlers</a:t>
+            </a:r>
+          </a:p>
+          <a:p>
+            <a:pPr lvl="1"/>
+            <a:r>
+              <a:rPr lang="en-US" dirty="0" smtClean="0"/>
+              <a:t>Templates (jinja2)</a:t>
+            </a:r>
+          </a:p>
+          <a:p>
+            <a:r>
+              <a:rPr lang="en-US" dirty="0" smtClean="0"/>
+              <a:t>Provides reusable modules to run tasks</a:t>
+            </a:r>
+            <a:endParaRPr lang="en-US" dirty="0" smtClean="0"/>
+          </a:p>
+          <a:p>
+            <a:endParaRPr lang="en-US" dirty="0" smtClean="0"/>
+          </a:p>
+          <a:p>
+            <a:r>
+              <a:rPr lang="en-US" dirty="0" smtClean="0"/>
+              <a:t>Can manage known hosts &amp; cloud services</a:t>
+            </a:r>
+            <a:endParaRPr lang="en-US" dirty="0"/>
+          </a:p>
+        </p:txBody>
+      </p:sp>
+      <p:pic>
+        <p:nvPicPr>
+          <p:cNvPr id="5" name="Picture 4"/>
+          <p:cNvPicPr>
+            <a:picLocks noChangeAspect="1"/>
+          </p:cNvPicPr>
+          <p:nvPr/>
+        </p:nvPicPr>
+        <p:blipFill>
+          <a:blip r:embed="rId2"/>
+          <a:stretch>
+            <a:fillRect/>
+          </a:stretch>
+        </p:blipFill>
+        <p:spPr>
+          <a:xfrm>
+            <a:off x="457200" y="227051"/>
+            <a:ext cx="1190587" cy="1190587"/>
+          </a:xfrm>
+          <a:prstGeom prst="rect">
+            <a:avLst/>
+          </a:prstGeom>
+        </p:spPr>
+      </p:pic>
+      <p:sp>
+        <p:nvSpPr>
+          <p:cNvPr id="6" name="TextBox 5"/>
+          <p:cNvSpPr txBox="1"/>
+          <p:nvPr/>
+        </p:nvSpPr>
+        <p:spPr>
+          <a:xfrm>
+            <a:off x="7197013" y="1606329"/>
+            <a:ext cx="1799253" cy="1569660"/>
+          </a:xfrm>
+          <a:prstGeom prst="rect">
+            <a:avLst/>
+          </a:prstGeom>
+          <a:noFill/>
+          <a:ln>
+            <a:solidFill>
+              <a:schemeClr val="tx1"/>
+            </a:solidFill>
+          </a:ln>
+        </p:spPr>
+        <p:txBody>
+          <a:bodyPr wrap="square" rtlCol="0">
+            <a:spAutoFit/>
+          </a:bodyPr>
+          <a:lstStyle/>
+          <a:p>
+            <a:r>
+              <a:rPr lang="en-US" sz="1600" b="1" dirty="0" smtClean="0"/>
+              <a:t>YAML: true</a:t>
+            </a:r>
+            <a:br>
+              <a:rPr lang="en-US" sz="1600" b="1" dirty="0" smtClean="0"/>
+            </a:br>
+            <a:r>
+              <a:rPr lang="en-US" sz="1600" b="1" dirty="0" smtClean="0"/>
+              <a:t>Fruits:</a:t>
+            </a:r>
+          </a:p>
+          <a:p>
+            <a:r>
+              <a:rPr lang="en-US" sz="1600" b="1" dirty="0" smtClean="0"/>
+              <a:t>- name: Apple</a:t>
+            </a:r>
+          </a:p>
+          <a:p>
+            <a:r>
+              <a:rPr lang="en-US" sz="1600" b="1" dirty="0" smtClean="0"/>
+              <a:t>   price: .50</a:t>
+            </a:r>
+          </a:p>
+          <a:p>
+            <a:r>
+              <a:rPr lang="en-US" sz="1600" b="1" dirty="0" smtClean="0"/>
+              <a:t>- name: Banana</a:t>
+            </a:r>
+            <a:br>
+              <a:rPr lang="en-US" sz="1600" b="1" dirty="0" smtClean="0"/>
+            </a:br>
+            <a:r>
+              <a:rPr lang="en-US" sz="1600" b="1" dirty="0" smtClean="0"/>
+              <a:t>   price: .80</a:t>
+            </a:r>
+            <a:endParaRPr lang="en-US" sz="1600" b="1" dirty="0"/>
           </a:p>
         </p:txBody>
       </p:sp>
     </p:spTree>
     <p:extLst>
       <p:ext uri="{BB962C8B-B14F-4D97-AF65-F5344CB8AC3E}">
-        <p14:creationId xmlns:p14="http://schemas.microsoft.com/office/powerpoint/2010/main" val="2140372596"/>
+        <p14:creationId xmlns:p14="http://schemas.microsoft.com/office/powerpoint/2010/main" val="3771616672"/>
       </p:ext>
     </p:extLst>
   </p:cSld>
@@ -7292,7 +7291,7 @@
             </a:r>
             <a:r>
               <a:rPr lang="en-US" dirty="0" smtClean="0"/>
-              <a:t> Galaxy</a:t>
+              <a:t> Setup</a:t>
             </a:r>
             <a:endParaRPr lang="en-US" dirty="0"/>
           </a:p>
@@ -7313,23 +7312,14 @@
           <a:bodyPr/>
           <a:lstStyle/>
           <a:p>
-            <a:r>
-              <a:rPr lang="en-US" dirty="0" smtClean="0"/>
-              <a:t>Many modules available</a:t>
-            </a:r>
-          </a:p>
-          <a:p>
-            <a:r>
-              <a:rPr lang="en-US" dirty="0" smtClean="0"/>
-              <a:t>Many integrations with clouds, vagrant, etc.</a:t>
-            </a:r>
+            <a:endParaRPr lang="en-US"/>
           </a:p>
         </p:txBody>
       </p:sp>
     </p:spTree>
     <p:extLst>
       <p:ext uri="{BB962C8B-B14F-4D97-AF65-F5344CB8AC3E}">
-        <p14:creationId xmlns:p14="http://schemas.microsoft.com/office/powerpoint/2010/main" val="640519589"/>
+        <p14:creationId xmlns:p14="http://schemas.microsoft.com/office/powerpoint/2010/main" val="2140372596"/>
       </p:ext>
     </p:extLst>
   </p:cSld>
@@ -7372,16 +7362,12 @@
           <a:lstStyle/>
           <a:p>
             <a:r>
-              <a:rPr lang="en-US" dirty="0" smtClean="0"/>
-              <a:t>With </a:t>
-            </a:r>
-            <a:r>
               <a:rPr lang="en-US" dirty="0" err="1" smtClean="0"/>
               <a:t>Ansible</a:t>
             </a:r>
             <a:r>
               <a:rPr lang="en-US" dirty="0" smtClean="0"/>
-              <a:t> it’s like…</a:t>
+              <a:t> Galaxy</a:t>
             </a:r>
             <a:endParaRPr lang="en-US" dirty="0"/>
           </a:p>
@@ -7399,67 +7385,26 @@
         </p:nvSpPr>
         <p:spPr/>
         <p:txBody>
-          <a:bodyPr>
-            <a:normAutofit lnSpcReduction="10000"/>
-          </a:bodyPr>
+          <a:bodyPr/>
           <a:lstStyle/>
           <a:p>
             <a:r>
               <a:rPr lang="en-US" dirty="0" smtClean="0"/>
-              <a:t>Defining and documenting your infrastructure</a:t>
+              <a:t>Many modules available</a:t>
             </a:r>
           </a:p>
           <a:p>
             <a:r>
               <a:rPr lang="en-US" dirty="0" smtClean="0"/>
-              <a:t>Thinking about a final state (</a:t>
-            </a:r>
-            <a:r>
-              <a:rPr lang="en-US" dirty="0" err="1" smtClean="0"/>
-              <a:t>idempotence</a:t>
-            </a:r>
-            <a:r>
-              <a:rPr lang="en-US" dirty="0" smtClean="0"/>
-              <a:t>)</a:t>
-            </a:r>
-          </a:p>
-          <a:p>
-            <a:r>
-              <a:rPr lang="en-US" dirty="0" smtClean="0"/>
-              <a:t>Modules pave the way to simple setups</a:t>
-            </a:r>
-          </a:p>
-          <a:p>
-            <a:r>
-              <a:rPr lang="en-US" dirty="0" smtClean="0"/>
-              <a:t>Iteration works in descriptive files, too!</a:t>
-            </a:r>
-          </a:p>
-          <a:p>
-            <a:r>
-              <a:rPr lang="en-US" dirty="0" smtClean="0"/>
-              <a:t>No more (or less) scripting, but still thinking!</a:t>
-            </a:r>
-          </a:p>
-          <a:p>
-            <a:r>
-              <a:rPr lang="en-US" dirty="0" smtClean="0"/>
-              <a:t>Support for continuous delivery and rolling upgrades</a:t>
-            </a:r>
-          </a:p>
-          <a:p>
-            <a:r>
-              <a:rPr lang="en-US" dirty="0" smtClean="0"/>
-              <a:t>Problems with Python may occur</a:t>
-            </a:r>
-            <a:endParaRPr lang="en-US" dirty="0" smtClean="0"/>
+              <a:t>Many integrations with clouds, vagrant, etc.</a:t>
+            </a:r>
           </a:p>
         </p:txBody>
       </p:sp>
     </p:spTree>
     <p:extLst>
       <p:ext uri="{BB962C8B-B14F-4D97-AF65-F5344CB8AC3E}">
-        <p14:creationId xmlns:p14="http://schemas.microsoft.com/office/powerpoint/2010/main" val="1661407509"/>
+        <p14:creationId xmlns:p14="http://schemas.microsoft.com/office/powerpoint/2010/main" val="640519589"/>
       </p:ext>
     </p:extLst>
   </p:cSld>
@@ -7488,6 +7433,136 @@
       </p:grpSpPr>
       <p:sp>
         <p:nvSpPr>
+          <p:cNvPr id="2" name="Title 1"/>
+          <p:cNvSpPr>
+            <a:spLocks noGrp="1"/>
+          </p:cNvSpPr>
+          <p:nvPr>
+            <p:ph type="title"/>
+          </p:nvPr>
+        </p:nvSpPr>
+        <p:spPr/>
+        <p:txBody>
+          <a:bodyPr/>
+          <a:lstStyle/>
+          <a:p>
+            <a:r>
+              <a:rPr lang="en-US" dirty="0" smtClean="0"/>
+              <a:t>With </a:t>
+            </a:r>
+            <a:r>
+              <a:rPr lang="en-US" dirty="0" err="1" smtClean="0"/>
+              <a:t>Ansible</a:t>
+            </a:r>
+            <a:r>
+              <a:rPr lang="en-US" dirty="0" smtClean="0"/>
+              <a:t> it’s like…</a:t>
+            </a:r>
+            <a:endParaRPr lang="en-US" dirty="0"/>
+          </a:p>
+        </p:txBody>
+      </p:sp>
+      <p:sp>
+        <p:nvSpPr>
+          <p:cNvPr id="3" name="Content Placeholder 2"/>
+          <p:cNvSpPr>
+            <a:spLocks noGrp="1"/>
+          </p:cNvSpPr>
+          <p:nvPr>
+            <p:ph idx="1"/>
+          </p:nvPr>
+        </p:nvSpPr>
+        <p:spPr/>
+        <p:txBody>
+          <a:bodyPr>
+            <a:normAutofit lnSpcReduction="10000"/>
+          </a:bodyPr>
+          <a:lstStyle/>
+          <a:p>
+            <a:r>
+              <a:rPr lang="en-US" dirty="0" smtClean="0"/>
+              <a:t>Defining and documenting your infrastructure</a:t>
+            </a:r>
+          </a:p>
+          <a:p>
+            <a:r>
+              <a:rPr lang="en-US" dirty="0" smtClean="0"/>
+              <a:t>Thinking about a final state (</a:t>
+            </a:r>
+            <a:r>
+              <a:rPr lang="en-US" dirty="0" err="1" smtClean="0"/>
+              <a:t>idempotence</a:t>
+            </a:r>
+            <a:r>
+              <a:rPr lang="en-US" dirty="0" smtClean="0"/>
+              <a:t>)</a:t>
+            </a:r>
+          </a:p>
+          <a:p>
+            <a:r>
+              <a:rPr lang="en-US" dirty="0" smtClean="0"/>
+              <a:t>Modules pave the way to simple setups</a:t>
+            </a:r>
+          </a:p>
+          <a:p>
+            <a:r>
+              <a:rPr lang="en-US" dirty="0" smtClean="0"/>
+              <a:t>Iteration works in descriptive files, too!</a:t>
+            </a:r>
+          </a:p>
+          <a:p>
+            <a:r>
+              <a:rPr lang="en-US" dirty="0" smtClean="0"/>
+              <a:t>No more (or less) scripting, but still thinking!</a:t>
+            </a:r>
+          </a:p>
+          <a:p>
+            <a:r>
+              <a:rPr lang="en-US" dirty="0" smtClean="0"/>
+              <a:t>Support for continuous delivery and rolling upgrades</a:t>
+            </a:r>
+          </a:p>
+          <a:p>
+            <a:r>
+              <a:rPr lang="en-US" dirty="0" smtClean="0"/>
+              <a:t>Problems with Python may occur</a:t>
+            </a:r>
+            <a:endParaRPr lang="en-US" dirty="0" smtClean="0"/>
+          </a:p>
+        </p:txBody>
+      </p:sp>
+    </p:spTree>
+    <p:extLst>
+      <p:ext uri="{BB962C8B-B14F-4D97-AF65-F5344CB8AC3E}">
+        <p14:creationId xmlns:p14="http://schemas.microsoft.com/office/powerpoint/2010/main" val="1661407509"/>
+      </p:ext>
+    </p:extLst>
+  </p:cSld>
+  <p:clrMapOvr>
+    <a:masterClrMapping/>
+  </p:clrMapOvr>
+</p:sld>
+</file>
+
+<file path=ppt/slides/slide18.xml><?xml version="1.0" encoding="utf-8"?>
+<p:sld xmlns:a="http://schemas.openxmlformats.org/drawingml/2006/main" xmlns:r="http://schemas.openxmlformats.org/officeDocument/2006/relationships" xmlns:p="http://schemas.openxmlformats.org/presentationml/2006/main">
+  <p:cSld>
+    <p:spTree>
+      <p:nvGrpSpPr>
+        <p:cNvPr id="1" name=""/>
+        <p:cNvGrpSpPr/>
+        <p:nvPr/>
+      </p:nvGrpSpPr>
+      <p:grpSpPr>
+        <a:xfrm>
+          <a:off x="0" y="0"/>
+          <a:ext cx="0" cy="0"/>
+          <a:chOff x="0" y="0"/>
+          <a:chExt cx="0" cy="0"/>
+        </a:xfrm>
+      </p:grpSpPr>
+      <p:sp>
+        <p:nvSpPr>
           <p:cNvPr id="4" name="Title 3"/>
           <p:cNvSpPr>
             <a:spLocks noGrp="1"/>
@@ -7545,7 +7620,7 @@
 </p:sld>
 </file>
 
-<file path=ppt/slides/slide18.xml><?xml version="1.0" encoding="utf-8"?>
+<file path=ppt/slides/slide19.xml><?xml version="1.0" encoding="utf-8"?>
 <p:sld xmlns:a="http://schemas.openxmlformats.org/drawingml/2006/main" xmlns:r="http://schemas.openxmlformats.org/officeDocument/2006/relationships" xmlns:p="http://schemas.openxmlformats.org/presentationml/2006/main">
   <p:cSld>
     <p:spTree>
@@ -8400,7 +8475,7 @@
           <a:graphicData uri="http://schemas.openxmlformats.org/presentationml/2006/ole">
             <mc:AlternateContent xmlns:mc="http://schemas.openxmlformats.org/markup-compatibility/2006">
               <mc:Choice xmlns:v="urn:schemas-microsoft-com:vml" Requires="v">
-                <p:oleObj spid="_x0000_s1043" name="Dokument" r:id="rId3" imgW="24330159" imgH="16558730" progId="Word.Document.12">
+                <p:oleObj spid="_x0000_s1045" name="Dokument" r:id="rId3" imgW="24330159" imgH="16558730" progId="Word.Document.12">
                   <p:link updateAutomatic="1"/>
                 </p:oleObj>
               </mc:Choice>
@@ -9181,6 +9256,89 @@
       </p:grpSpPr>
       <p:sp>
         <p:nvSpPr>
+          <p:cNvPr id="2" name="Title 1"/>
+          <p:cNvSpPr>
+            <a:spLocks noGrp="1"/>
+          </p:cNvSpPr>
+          <p:nvPr>
+            <p:ph type="title"/>
+          </p:nvPr>
+        </p:nvSpPr>
+        <p:spPr/>
+        <p:txBody>
+          <a:bodyPr/>
+          <a:lstStyle/>
+          <a:p>
+            <a:r>
+              <a:rPr lang="en-US" dirty="0" smtClean="0"/>
+              <a:t>Recap: Amazon Web Services</a:t>
+            </a:r>
+            <a:endParaRPr lang="en-US" dirty="0"/>
+          </a:p>
+        </p:txBody>
+      </p:sp>
+      <p:pic>
+        <p:nvPicPr>
+          <p:cNvPr id="5" name="Picture 4" descr="Screen Shot 2015-09-01 at 2.04.18 PM.png"/>
+          <p:cNvPicPr>
+            <a:picLocks noChangeAspect="1"/>
+          </p:cNvPicPr>
+          <p:nvPr/>
+        </p:nvPicPr>
+        <p:blipFill>
+          <a:blip r:embed="rId2">
+            <a:extLst>
+              <a:ext uri="{28A0092B-C50C-407E-A947-70E740481C1C}">
+                <a14:useLocalDpi xmlns:a14="http://schemas.microsoft.com/office/drawing/2010/main" val="0"/>
+              </a:ext>
+            </a:extLst>
+          </a:blip>
+          <a:stretch>
+            <a:fillRect/>
+          </a:stretch>
+        </p:blipFill>
+        <p:spPr>
+          <a:xfrm>
+            <a:off x="0" y="1417638"/>
+            <a:ext cx="9144000" cy="5229726"/>
+          </a:xfrm>
+          <a:prstGeom prst="rect">
+            <a:avLst/>
+          </a:prstGeom>
+        </p:spPr>
+      </p:pic>
+    </p:spTree>
+    <p:extLst>
+      <p:ext uri="{BB962C8B-B14F-4D97-AF65-F5344CB8AC3E}">
+        <p14:creationId xmlns:p14="http://schemas.microsoft.com/office/powerpoint/2010/main" val="1002464873"/>
+      </p:ext>
+    </p:extLst>
+  </p:cSld>
+  <p:clrMapOvr>
+    <a:masterClrMapping/>
+  </p:clrMapOvr>
+</p:sld>
+</file>
+
+<file path=ppt/slides/slide8.xml><?xml version="1.0" encoding="utf-8"?>
+<p:sld xmlns:a="http://schemas.openxmlformats.org/drawingml/2006/main" xmlns:r="http://schemas.openxmlformats.org/officeDocument/2006/relationships" xmlns:p="http://schemas.openxmlformats.org/presentationml/2006/main">
+  <p:cSld>
+    <p:spTree>
+      <p:nvGrpSpPr>
+        <p:cNvPr id="1" name=""/>
+        <p:cNvGrpSpPr/>
+        <p:nvPr/>
+      </p:nvGrpSpPr>
+      <p:grpSpPr>
+        <a:xfrm>
+          <a:off x="0" y="0"/>
+          <a:ext cx="0" cy="0"/>
+          <a:chOff x="0" y="0"/>
+          <a:chExt cx="0" cy="0"/>
+        </a:xfrm>
+      </p:grpSpPr>
+      <p:sp>
+        <p:nvSpPr>
           <p:cNvPr id="2" name="Titel 1"/>
           <p:cNvSpPr>
             <a:spLocks noGrp="1"/>
@@ -9377,78 +9535,6 @@
 </p:sld>
 </file>
 
-<file path=ppt/slides/slide8.xml><?xml version="1.0" encoding="utf-8"?>
-<p:sld xmlns:a="http://schemas.openxmlformats.org/drawingml/2006/main" xmlns:r="http://schemas.openxmlformats.org/officeDocument/2006/relationships" xmlns:p="http://schemas.openxmlformats.org/presentationml/2006/main">
-  <p:cSld>
-    <p:spTree>
-      <p:nvGrpSpPr>
-        <p:cNvPr id="1" name=""/>
-        <p:cNvGrpSpPr/>
-        <p:nvPr/>
-      </p:nvGrpSpPr>
-      <p:grpSpPr>
-        <a:xfrm>
-          <a:off x="0" y="0"/>
-          <a:ext cx="0" cy="0"/>
-          <a:chOff x="0" y="0"/>
-          <a:chExt cx="0" cy="0"/>
-        </a:xfrm>
-      </p:grpSpPr>
-      <p:sp>
-        <p:nvSpPr>
-          <p:cNvPr id="4" name="Title 3"/>
-          <p:cNvSpPr>
-            <a:spLocks noGrp="1"/>
-          </p:cNvSpPr>
-          <p:nvPr>
-            <p:ph type="title"/>
-          </p:nvPr>
-        </p:nvSpPr>
-        <p:spPr/>
-        <p:txBody>
-          <a:bodyPr/>
-          <a:lstStyle/>
-          <a:p>
-            <a:r>
-              <a:rPr lang="en-US" dirty="0" smtClean="0"/>
-              <a:t>Infrastructure Automation</a:t>
-            </a:r>
-            <a:endParaRPr lang="en-US" dirty="0"/>
-          </a:p>
-        </p:txBody>
-      </p:sp>
-      <p:sp>
-        <p:nvSpPr>
-          <p:cNvPr id="5" name="Text Placeholder 4"/>
-          <p:cNvSpPr>
-            <a:spLocks noGrp="1"/>
-          </p:cNvSpPr>
-          <p:nvPr>
-            <p:ph type="body" idx="1"/>
-          </p:nvPr>
-        </p:nvSpPr>
-        <p:spPr/>
-        <p:txBody>
-          <a:bodyPr/>
-          <a:lstStyle/>
-          <a:p>
-            <a:endParaRPr lang="en-US"/>
-          </a:p>
-        </p:txBody>
-      </p:sp>
-    </p:spTree>
-    <p:extLst>
-      <p:ext uri="{BB962C8B-B14F-4D97-AF65-F5344CB8AC3E}">
-        <p14:creationId xmlns:p14="http://schemas.microsoft.com/office/powerpoint/2010/main" val="2175579239"/>
-      </p:ext>
-    </p:extLst>
-  </p:cSld>
-  <p:clrMapOvr>
-    <a:masterClrMapping/>
-  </p:clrMapOvr>
-</p:sld>
-</file>
-
 <file path=ppt/slides/slide9.xml><?xml version="1.0" encoding="utf-8"?>
 <p:sld xmlns:a="http://schemas.openxmlformats.org/drawingml/2006/main" xmlns:r="http://schemas.openxmlformats.org/officeDocument/2006/relationships" xmlns:p="http://schemas.openxmlformats.org/presentationml/2006/main">
   <p:cSld>
@@ -9468,7 +9554,7 @@
       </p:grpSpPr>
       <p:sp>
         <p:nvSpPr>
-          <p:cNvPr id="2" name="Title 1"/>
+          <p:cNvPr id="4" name="Title 3"/>
           <p:cNvSpPr>
             <a:spLocks noGrp="1"/>
           </p:cNvSpPr>
@@ -9478,14 +9564,12 @@
         </p:nvSpPr>
         <p:spPr/>
         <p:txBody>
-          <a:bodyPr>
-            <a:normAutofit fontScale="90000"/>
-          </a:bodyPr>
+          <a:bodyPr/>
           <a:lstStyle/>
           <a:p>
             <a:r>
               <a:rPr lang="en-US" dirty="0" smtClean="0"/>
-              <a:t>Infrastructure Automation Approaches</a:t>
+              <a:t>Infrastructure Automation</a:t>
             </a:r>
             <a:endParaRPr lang="en-US" dirty="0"/>
           </a:p>
@@ -9493,12 +9577,12 @@
       </p:sp>
       <p:sp>
         <p:nvSpPr>
-          <p:cNvPr id="3" name="Content Placeholder 2"/>
+          <p:cNvPr id="5" name="Text Placeholder 4"/>
           <p:cNvSpPr>
             <a:spLocks noGrp="1"/>
           </p:cNvSpPr>
           <p:nvPr>
-            <p:ph idx="1"/>
+            <p:ph type="body" idx="1"/>
           </p:nvPr>
         </p:nvSpPr>
         <p:spPr/>
@@ -9513,7 +9597,7 @@
     </p:spTree>
     <p:extLst>
       <p:ext uri="{BB962C8B-B14F-4D97-AF65-F5344CB8AC3E}">
-        <p14:creationId xmlns:p14="http://schemas.microsoft.com/office/powerpoint/2010/main" val="2322301947"/>
+        <p14:creationId xmlns:p14="http://schemas.microsoft.com/office/powerpoint/2010/main" val="2175579239"/>
       </p:ext>
     </p:extLst>
   </p:cSld>

</xml_diff>